<commit_message>
category.html na pasta web. apresentação na pasta utils
</commit_message>
<xml_diff>
--- a/utils/Modelo de Apresentação.pptx
+++ b/utils/Modelo de Apresentação.pptx
@@ -347,7 +347,7 @@
             <a:fld id="{1D8BD707-D9CF-40AE-B4C6-C98DA3205C09}" type="datetimeFigureOut">
               <a:rPr lang="en-US" smtClean="0"/>
               <a:pPr/>
-              <a:t>9/17/2025</a:t>
+              <a:t>9/18/2025</a:t>
             </a:fld>
             <a:endParaRPr lang="en-US"/>
           </a:p>
@@ -512,7 +512,7 @@
             <a:fld id="{1D8BD707-D9CF-40AE-B4C6-C98DA3205C09}" type="datetimeFigureOut">
               <a:rPr lang="en-US" smtClean="0"/>
               <a:pPr/>
-              <a:t>9/17/2025</a:t>
+              <a:t>9/18/2025</a:t>
             </a:fld>
             <a:endParaRPr lang="en-US"/>
           </a:p>
@@ -687,7 +687,7 @@
             <a:fld id="{1D8BD707-D9CF-40AE-B4C6-C98DA3205C09}" type="datetimeFigureOut">
               <a:rPr lang="en-US" smtClean="0"/>
               <a:pPr/>
-              <a:t>9/17/2025</a:t>
+              <a:t>9/18/2025</a:t>
             </a:fld>
             <a:endParaRPr lang="en-US"/>
           </a:p>
@@ -852,7 +852,7 @@
             <a:fld id="{1D8BD707-D9CF-40AE-B4C6-C98DA3205C09}" type="datetimeFigureOut">
               <a:rPr lang="en-US" smtClean="0"/>
               <a:pPr/>
-              <a:t>9/17/2025</a:t>
+              <a:t>9/18/2025</a:t>
             </a:fld>
             <a:endParaRPr lang="en-US"/>
           </a:p>
@@ -1094,7 +1094,7 @@
             <a:fld id="{1D8BD707-D9CF-40AE-B4C6-C98DA3205C09}" type="datetimeFigureOut">
               <a:rPr lang="en-US" smtClean="0"/>
               <a:pPr/>
-              <a:t>9/17/2025</a:t>
+              <a:t>9/18/2025</a:t>
             </a:fld>
             <a:endParaRPr lang="en-US"/>
           </a:p>
@@ -1376,7 +1376,7 @@
             <a:fld id="{1D8BD707-D9CF-40AE-B4C6-C98DA3205C09}" type="datetimeFigureOut">
               <a:rPr lang="en-US" smtClean="0"/>
               <a:pPr/>
-              <a:t>9/17/2025</a:t>
+              <a:t>9/18/2025</a:t>
             </a:fld>
             <a:endParaRPr lang="en-US"/>
           </a:p>
@@ -1792,7 +1792,7 @@
             <a:fld id="{1D8BD707-D9CF-40AE-B4C6-C98DA3205C09}" type="datetimeFigureOut">
               <a:rPr lang="en-US" smtClean="0"/>
               <a:pPr/>
-              <a:t>9/17/2025</a:t>
+              <a:t>9/18/2025</a:t>
             </a:fld>
             <a:endParaRPr lang="en-US"/>
           </a:p>
@@ -1906,7 +1906,7 @@
             <a:fld id="{1D8BD707-D9CF-40AE-B4C6-C98DA3205C09}" type="datetimeFigureOut">
               <a:rPr lang="en-US" smtClean="0"/>
               <a:pPr/>
-              <a:t>9/17/2025</a:t>
+              <a:t>9/18/2025</a:t>
             </a:fld>
             <a:endParaRPr lang="en-US"/>
           </a:p>
@@ -1998,7 +1998,7 @@
             <a:fld id="{1D8BD707-D9CF-40AE-B4C6-C98DA3205C09}" type="datetimeFigureOut">
               <a:rPr lang="en-US" smtClean="0"/>
               <a:pPr/>
-              <a:t>9/17/2025</a:t>
+              <a:t>9/18/2025</a:t>
             </a:fld>
             <a:endParaRPr lang="en-US"/>
           </a:p>
@@ -2270,7 +2270,7 @@
             <a:fld id="{1D8BD707-D9CF-40AE-B4C6-C98DA3205C09}" type="datetimeFigureOut">
               <a:rPr lang="en-US" smtClean="0"/>
               <a:pPr/>
-              <a:t>9/17/2025</a:t>
+              <a:t>9/18/2025</a:t>
             </a:fld>
             <a:endParaRPr lang="en-US"/>
           </a:p>
@@ -2519,7 +2519,7 @@
             <a:fld id="{1D8BD707-D9CF-40AE-B4C6-C98DA3205C09}" type="datetimeFigureOut">
               <a:rPr lang="en-US" smtClean="0"/>
               <a:pPr/>
-              <a:t>9/17/2025</a:t>
+              <a:t>9/18/2025</a:t>
             </a:fld>
             <a:endParaRPr lang="en-US"/>
           </a:p>
@@ -2727,7 +2727,7 @@
             <a:fld id="{1D8BD707-D9CF-40AE-B4C6-C98DA3205C09}" type="datetimeFigureOut">
               <a:rPr lang="en-US" smtClean="0"/>
               <a:pPr/>
-              <a:t>9/17/2025</a:t>
+              <a:t>9/18/2025</a:t>
             </a:fld>
             <a:endParaRPr lang="en-US"/>
           </a:p>
@@ -3555,54 +3555,6 @@
       </p:grpSpPr>
       <p:sp>
         <p:nvSpPr>
-          <p:cNvPr id="2" name="Freeform 2"/>
-          <p:cNvSpPr/>
-          <p:nvPr/>
-        </p:nvSpPr>
-        <p:spPr>
-          <a:xfrm>
-            <a:off x="0" y="0"/>
-            <a:ext cx="18288000" cy="10287000"/>
-          </a:xfrm>
-          <a:custGeom>
-            <a:avLst/>
-            <a:gdLst/>
-            <a:ahLst/>
-            <a:cxnLst/>
-            <a:rect l="l" t="t" r="r" b="b"/>
-            <a:pathLst>
-              <a:path w="18288000" h="10287000">
-                <a:moveTo>
-                  <a:pt x="0" y="0"/>
-                </a:moveTo>
-                <a:lnTo>
-                  <a:pt x="18288000" y="0"/>
-                </a:lnTo>
-                <a:lnTo>
-                  <a:pt x="18288000" y="10287000"/>
-                </a:lnTo>
-                <a:lnTo>
-                  <a:pt x="0" y="10287000"/>
-                </a:lnTo>
-                <a:lnTo>
-                  <a:pt x="0" y="0"/>
-                </a:lnTo>
-                <a:close/>
-              </a:path>
-            </a:pathLst>
-          </a:custGeom>
-          <a:blipFill>
-            <a:blip r:embed="rId2">
-              <a:alphaModFix amt="20999"/>
-            </a:blip>
-            <a:stretch>
-              <a:fillRect/>
-            </a:stretch>
-          </a:blipFill>
-        </p:spPr>
-      </p:sp>
-      <p:sp>
-        <p:nvSpPr>
           <p:cNvPr id="3" name="Freeform 3"/>
           <p:cNvSpPr/>
           <p:nvPr/>
@@ -3640,12 +3592,67 @@
             </a:pathLst>
           </a:custGeom>
           <a:blipFill>
-            <a:blip r:embed="rId3">
+            <a:blip r:embed="rId2">
               <a:extLst>
                 <a:ext uri="{96DAC541-7B7A-43D3-8B79-37D633B846F1}">
-                  <asvg:svgBlip xmlns:asvg="http://schemas.microsoft.com/office/drawing/2016/SVG/main" r:embed="rId4"/>
+                  <asvg:svgBlip xmlns:asvg="http://schemas.microsoft.com/office/drawing/2016/SVG/main" r:embed="rId3"/>
                 </a:ext>
               </a:extLst>
+            </a:blip>
+            <a:stretch>
+              <a:fillRect/>
+            </a:stretch>
+          </a:blipFill>
+        </p:spPr>
+        <p:txBody>
+          <a:bodyPr/>
+          <a:lstStyle/>
+          <a:p>
+            <a:endParaRPr lang="pt-PT" dirty="0"/>
+          </a:p>
+        </p:txBody>
+      </p:sp>
+      <p:sp>
+        <p:nvSpPr>
+          <p:cNvPr id="2" name="Freeform 2"/>
+          <p:cNvSpPr/>
+          <p:nvPr/>
+        </p:nvSpPr>
+        <p:spPr>
+          <a:xfrm>
+            <a:off x="27470" y="49975"/>
+            <a:ext cx="18288000" cy="10287000"/>
+          </a:xfrm>
+          <a:custGeom>
+            <a:avLst/>
+            <a:gdLst/>
+            <a:ahLst/>
+            <a:cxnLst/>
+            <a:rect l="l" t="t" r="r" b="b"/>
+            <a:pathLst>
+              <a:path w="18288000" h="10287000">
+                <a:moveTo>
+                  <a:pt x="0" y="0"/>
+                </a:moveTo>
+                <a:lnTo>
+                  <a:pt x="18288000" y="0"/>
+                </a:lnTo>
+                <a:lnTo>
+                  <a:pt x="18288000" y="10287000"/>
+                </a:lnTo>
+                <a:lnTo>
+                  <a:pt x="0" y="10287000"/>
+                </a:lnTo>
+                <a:lnTo>
+                  <a:pt x="0" y="0"/>
+                </a:lnTo>
+                <a:close/>
+              </a:path>
+            </a:pathLst>
+          </a:custGeom>
+          <a:blipFill>
+            <a:blip r:embed="rId4">
+              <a:alphaModFix amt="20999"/>
             </a:blip>
             <a:stretch>
               <a:fillRect/>
@@ -4285,82 +4292,34 @@
       </p:sp>
       <p:sp>
         <p:nvSpPr>
-          <p:cNvPr id="18" name="TextBox 18"/>
+          <p:cNvPr id="19" name="TextBox 19"/>
           <p:cNvSpPr txBox="1"/>
           <p:nvPr/>
         </p:nvSpPr>
         <p:spPr>
           <a:xfrm>
-            <a:off x="709412" y="3431391"/>
-            <a:ext cx="5541921" cy="1137523"/>
+            <a:off x="709412" y="4337851"/>
+            <a:ext cx="5926989" cy="1969770"/>
           </a:xfrm>
           <a:prstGeom prst="rect">
             <a:avLst/>
           </a:prstGeom>
         </p:spPr>
         <p:txBody>
-          <a:bodyPr lIns="0" tIns="0" rIns="0" bIns="0" rtlCol="0" anchor="t">
+          <a:bodyPr wrap="square" lIns="0" tIns="0" rIns="0" bIns="0" rtlCol="0" anchor="t">
             <a:spAutoFit/>
           </a:bodyPr>
           <a:lstStyle/>
           <a:p>
-            <a:pPr algn="l">
-              <a:lnSpc>
-                <a:spcPts val="2924"/>
-              </a:lnSpc>
-            </a:pPr>
-            <a:r>
-              <a:rPr lang="en-US" sz="2125">
+            <a:pPr algn="l"/>
+            <a:r>
+              <a:rPr lang="pt-PT" sz="3200" b="0" i="0" u="none" strike="noStrike" baseline="0" dirty="0">
                 <a:solidFill>
                   <a:srgbClr val="FFFFFF"/>
                 </a:solidFill>
-                <a:latin typeface="Poppins"/>
-                <a:ea typeface="Poppins"/>
-                <a:cs typeface="Poppins"/>
-                <a:sym typeface="Poppins"/>
+                <a:latin typeface="FiraSans-Regular"/>
               </a:rPr>
-              <a:t>Lorem ipsum dolor sit amet, consectetur adipiscing elit, sed do eiusmod tempor incididunt ut labore et dolore </a:t>
-            </a:r>
-          </a:p>
-        </p:txBody>
-      </p:sp>
-      <p:sp>
-        <p:nvSpPr>
-          <p:cNvPr id="19" name="TextBox 19"/>
-          <p:cNvSpPr txBox="1"/>
-          <p:nvPr/>
-        </p:nvSpPr>
-        <p:spPr>
-          <a:xfrm>
-            <a:off x="709412" y="5472894"/>
-            <a:ext cx="5541921" cy="1137523"/>
-          </a:xfrm>
-          <a:prstGeom prst="rect">
-            <a:avLst/>
-          </a:prstGeom>
-        </p:spPr>
-        <p:txBody>
-          <a:bodyPr lIns="0" tIns="0" rIns="0" bIns="0" rtlCol="0" anchor="t">
-            <a:spAutoFit/>
-          </a:bodyPr>
-          <a:lstStyle/>
-          <a:p>
-            <a:pPr algn="l">
-              <a:lnSpc>
-                <a:spcPts val="2924"/>
-              </a:lnSpc>
-            </a:pPr>
-            <a:r>
-              <a:rPr lang="en-US" sz="2125">
-                <a:solidFill>
-                  <a:srgbClr val="FFFFFF"/>
-                </a:solidFill>
-                <a:latin typeface="Poppins"/>
-                <a:ea typeface="Poppins"/>
-                <a:cs typeface="Poppins"/>
-                <a:sym typeface="Poppins"/>
-              </a:rPr>
-              <a:t>Lorem ipsum dolor sit amet, consectetur adipiscing elit, sed do eiusmod tempor incididunt ut labore et dolore </a:t>
+              <a:t>Sistema interno de perguntas e respostas para que colaboradores de uma empresa possam se ajudar mutuamente.</a:t>
             </a:r>
           </a:p>
         </p:txBody>
@@ -4509,214 +4468,6 @@
         <p:sp>
           <p:nvSpPr>
             <p:cNvPr id="5" name="Freeform 5"/>
-            <p:cNvSpPr/>
-            <p:nvPr/>
-          </p:nvSpPr>
-          <p:spPr>
-            <a:xfrm>
-              <a:off x="0" y="0"/>
-              <a:ext cx="114300" cy="114300"/>
-            </a:xfrm>
-            <a:custGeom>
-              <a:avLst/>
-              <a:gdLst/>
-              <a:ahLst/>
-              <a:cxnLst/>
-              <a:rect l="l" t="t" r="r" b="b"/>
-              <a:pathLst>
-                <a:path w="114300" h="114300">
-                  <a:moveTo>
-                    <a:pt x="114300" y="57150"/>
-                  </a:moveTo>
-                  <a:cubicBezTo>
-                    <a:pt x="114300" y="60960"/>
-                    <a:pt x="113919" y="64643"/>
-                    <a:pt x="113157" y="68326"/>
-                  </a:cubicBezTo>
-                  <a:cubicBezTo>
-                    <a:pt x="112395" y="72009"/>
-                    <a:pt x="111379" y="75565"/>
-                    <a:pt x="109855" y="78994"/>
-                  </a:cubicBezTo>
-                  <a:cubicBezTo>
-                    <a:pt x="108331" y="82423"/>
-                    <a:pt x="106680" y="85725"/>
-                    <a:pt x="104521" y="88900"/>
-                  </a:cubicBezTo>
-                  <a:cubicBezTo>
-                    <a:pt x="102362" y="92075"/>
-                    <a:pt x="100076" y="94869"/>
-                    <a:pt x="97409" y="97536"/>
-                  </a:cubicBezTo>
-                  <a:cubicBezTo>
-                    <a:pt x="94742" y="100203"/>
-                    <a:pt x="91821" y="102616"/>
-                    <a:pt x="88773" y="104648"/>
-                  </a:cubicBezTo>
-                  <a:cubicBezTo>
-                    <a:pt x="85725" y="106680"/>
-                    <a:pt x="82296" y="108458"/>
-                    <a:pt x="78867" y="109982"/>
-                  </a:cubicBezTo>
-                  <a:cubicBezTo>
-                    <a:pt x="75438" y="111506"/>
-                    <a:pt x="71882" y="112522"/>
-                    <a:pt x="68199" y="113284"/>
-                  </a:cubicBezTo>
-                  <a:cubicBezTo>
-                    <a:pt x="64516" y="114046"/>
-                    <a:pt x="60960" y="114300"/>
-                    <a:pt x="57150" y="114300"/>
-                  </a:cubicBezTo>
-                  <a:cubicBezTo>
-                    <a:pt x="53340" y="114300"/>
-                    <a:pt x="49657" y="113919"/>
-                    <a:pt x="45974" y="113157"/>
-                  </a:cubicBezTo>
-                  <a:cubicBezTo>
-                    <a:pt x="42291" y="112395"/>
-                    <a:pt x="38735" y="111379"/>
-                    <a:pt x="35306" y="109855"/>
-                  </a:cubicBezTo>
-                  <a:cubicBezTo>
-                    <a:pt x="31877" y="108331"/>
-                    <a:pt x="28575" y="106680"/>
-                    <a:pt x="25400" y="104521"/>
-                  </a:cubicBezTo>
-                  <a:cubicBezTo>
-                    <a:pt x="22225" y="102362"/>
-                    <a:pt x="19431" y="100076"/>
-                    <a:pt x="16764" y="97409"/>
-                  </a:cubicBezTo>
-                  <a:cubicBezTo>
-                    <a:pt x="14097" y="94742"/>
-                    <a:pt x="11684" y="92075"/>
-                    <a:pt x="9652" y="88900"/>
-                  </a:cubicBezTo>
-                  <a:cubicBezTo>
-                    <a:pt x="7620" y="85725"/>
-                    <a:pt x="5842" y="82550"/>
-                    <a:pt x="4318" y="78994"/>
-                  </a:cubicBezTo>
-                  <a:cubicBezTo>
-                    <a:pt x="2794" y="75438"/>
-                    <a:pt x="1778" y="72009"/>
-                    <a:pt x="1143" y="68326"/>
-                  </a:cubicBezTo>
-                  <a:cubicBezTo>
-                    <a:pt x="508" y="64643"/>
-                    <a:pt x="0" y="60960"/>
-                    <a:pt x="0" y="57150"/>
-                  </a:cubicBezTo>
-                  <a:cubicBezTo>
-                    <a:pt x="0" y="53340"/>
-                    <a:pt x="381" y="49657"/>
-                    <a:pt x="1143" y="45974"/>
-                  </a:cubicBezTo>
-                  <a:cubicBezTo>
-                    <a:pt x="1905" y="42291"/>
-                    <a:pt x="2921" y="38735"/>
-                    <a:pt x="4445" y="35306"/>
-                  </a:cubicBezTo>
-                  <a:cubicBezTo>
-                    <a:pt x="5969" y="31877"/>
-                    <a:pt x="7493" y="28575"/>
-                    <a:pt x="9652" y="25400"/>
-                  </a:cubicBezTo>
-                  <a:cubicBezTo>
-                    <a:pt x="11811" y="22225"/>
-                    <a:pt x="14097" y="19431"/>
-                    <a:pt x="16764" y="16764"/>
-                  </a:cubicBezTo>
-                  <a:cubicBezTo>
-                    <a:pt x="19431" y="14097"/>
-                    <a:pt x="22352" y="11684"/>
-                    <a:pt x="25400" y="9652"/>
-                  </a:cubicBezTo>
-                  <a:cubicBezTo>
-                    <a:pt x="28448" y="7620"/>
-                    <a:pt x="31877" y="5842"/>
-                    <a:pt x="35306" y="4318"/>
-                  </a:cubicBezTo>
-                  <a:cubicBezTo>
-                    <a:pt x="38735" y="2794"/>
-                    <a:pt x="42291" y="1778"/>
-                    <a:pt x="45974" y="1016"/>
-                  </a:cubicBezTo>
-                  <a:cubicBezTo>
-                    <a:pt x="49657" y="254"/>
-                    <a:pt x="53340" y="0"/>
-                    <a:pt x="57150" y="0"/>
-                  </a:cubicBezTo>
-                  <a:cubicBezTo>
-                    <a:pt x="60960" y="0"/>
-                    <a:pt x="64643" y="381"/>
-                    <a:pt x="68326" y="1143"/>
-                  </a:cubicBezTo>
-                  <a:cubicBezTo>
-                    <a:pt x="72009" y="1905"/>
-                    <a:pt x="75565" y="2921"/>
-                    <a:pt x="78994" y="4445"/>
-                  </a:cubicBezTo>
-                  <a:cubicBezTo>
-                    <a:pt x="82423" y="5969"/>
-                    <a:pt x="85725" y="7620"/>
-                    <a:pt x="88900" y="9779"/>
-                  </a:cubicBezTo>
-                  <a:cubicBezTo>
-                    <a:pt x="92075" y="11938"/>
-                    <a:pt x="94869" y="14224"/>
-                    <a:pt x="97536" y="16891"/>
-                  </a:cubicBezTo>
-                  <a:cubicBezTo>
-                    <a:pt x="100203" y="19558"/>
-                    <a:pt x="102616" y="22479"/>
-                    <a:pt x="104648" y="25527"/>
-                  </a:cubicBezTo>
-                  <a:cubicBezTo>
-                    <a:pt x="106680" y="28575"/>
-                    <a:pt x="108458" y="32004"/>
-                    <a:pt x="109982" y="35433"/>
-                  </a:cubicBezTo>
-                  <a:cubicBezTo>
-                    <a:pt x="111506" y="38862"/>
-                    <a:pt x="112522" y="42418"/>
-                    <a:pt x="113284" y="46101"/>
-                  </a:cubicBezTo>
-                  <a:cubicBezTo>
-                    <a:pt x="114046" y="49784"/>
-                    <a:pt x="114300" y="53340"/>
-                    <a:pt x="114300" y="57150"/>
-                  </a:cubicBezTo>
-                  <a:close/>
-                </a:path>
-              </a:pathLst>
-            </a:custGeom>
-            <a:solidFill>
-              <a:srgbClr val="000000"/>
-            </a:solidFill>
-          </p:spPr>
-        </p:sp>
-      </p:grpSp>
-      <p:grpSp>
-        <p:nvGrpSpPr>
-          <p:cNvPr id="6" name="Group 6"/>
-          <p:cNvGrpSpPr>
-            <a:grpSpLocks noChangeAspect="1"/>
-          </p:cNvGrpSpPr>
-          <p:nvPr/>
-        </p:nvGrpSpPr>
-        <p:grpSpPr>
-          <a:xfrm>
-            <a:off x="1082297" y="5130803"/>
-            <a:ext cx="114300" cy="114300"/>
-            <a:chOff x="0" y="0"/>
-            <a:chExt cx="114300" cy="114300"/>
-          </a:xfrm>
-        </p:grpSpPr>
-        <p:sp>
-          <p:nvSpPr>
-            <p:cNvPr id="7" name="Freeform 7"/>
             <p:cNvSpPr/>
             <p:nvPr/>
           </p:nvSpPr>
@@ -5508,7 +5259,7 @@
         <p:spPr>
           <a:xfrm>
             <a:off x="1364771" y="4110695"/>
-            <a:ext cx="10257644" cy="3092415"/>
+            <a:ext cx="10257644" cy="3032818"/>
           </a:xfrm>
           <a:prstGeom prst="rect">
             <a:avLst/>
@@ -5526,7 +5277,7 @@
               </a:lnSpc>
             </a:pPr>
             <a:r>
-              <a:rPr lang="en-US" sz="2499">
+              <a:rPr lang="en-US" sz="2499" dirty="0">
                 <a:solidFill>
                   <a:srgbClr val="000000"/>
                 </a:solidFill>
@@ -5535,7 +5286,501 @@
                 <a:cs typeface="Poppins"/>
                 <a:sym typeface="Poppins"/>
               </a:rPr>
-              <a:t>Quadro Kanban no Trello: Para organização e acompanhamento visual das tarefas. Sprints: Ciclos de desenvolvimento curtos e focados. Reuniões Diárias (Daily): Alinhamento rápido sobre progresso e impedimentos. Entrega Iterativa: Evolução constante do produto com base em feedbacks.</a:t>
+              <a:t>Quadro Kanban no Trello: Para </a:t>
+            </a:r>
+            <a:r>
+              <a:rPr lang="en-US" sz="2499" dirty="0" err="1">
+                <a:solidFill>
+                  <a:srgbClr val="000000"/>
+                </a:solidFill>
+                <a:latin typeface="Poppins"/>
+                <a:ea typeface="Poppins"/>
+                <a:cs typeface="Poppins"/>
+                <a:sym typeface="Poppins"/>
+              </a:rPr>
+              <a:t>organização</a:t>
+            </a:r>
+            <a:r>
+              <a:rPr lang="en-US" sz="2499" dirty="0">
+                <a:solidFill>
+                  <a:srgbClr val="000000"/>
+                </a:solidFill>
+                <a:latin typeface="Poppins"/>
+                <a:ea typeface="Poppins"/>
+                <a:cs typeface="Poppins"/>
+                <a:sym typeface="Poppins"/>
+              </a:rPr>
+              <a:t> e </a:t>
+            </a:r>
+            <a:r>
+              <a:rPr lang="en-US" sz="2499" dirty="0" err="1">
+                <a:solidFill>
+                  <a:srgbClr val="000000"/>
+                </a:solidFill>
+                <a:latin typeface="Poppins"/>
+                <a:ea typeface="Poppins"/>
+                <a:cs typeface="Poppins"/>
+                <a:sym typeface="Poppins"/>
+              </a:rPr>
+              <a:t>acompanhamento</a:t>
+            </a:r>
+            <a:r>
+              <a:rPr lang="en-US" sz="2499" dirty="0">
+                <a:solidFill>
+                  <a:srgbClr val="000000"/>
+                </a:solidFill>
+                <a:latin typeface="Poppins"/>
+                <a:ea typeface="Poppins"/>
+                <a:cs typeface="Poppins"/>
+                <a:sym typeface="Poppins"/>
+              </a:rPr>
+              <a:t> visual das </a:t>
+            </a:r>
+            <a:r>
+              <a:rPr lang="en-US" sz="2499" dirty="0" err="1">
+                <a:solidFill>
+                  <a:srgbClr val="000000"/>
+                </a:solidFill>
+                <a:latin typeface="Poppins"/>
+                <a:ea typeface="Poppins"/>
+                <a:cs typeface="Poppins"/>
+                <a:sym typeface="Poppins"/>
+              </a:rPr>
+              <a:t>tarefas</a:t>
+            </a:r>
+            <a:r>
+              <a:rPr lang="en-US" sz="2499" dirty="0">
+                <a:solidFill>
+                  <a:srgbClr val="000000"/>
+                </a:solidFill>
+                <a:latin typeface="Poppins"/>
+                <a:ea typeface="Poppins"/>
+                <a:cs typeface="Poppins"/>
+                <a:sym typeface="Poppins"/>
+              </a:rPr>
+              <a:t>. Sprints: </a:t>
+            </a:r>
+            <a:r>
+              <a:rPr lang="en-US" sz="2499" dirty="0" err="1">
+                <a:solidFill>
+                  <a:srgbClr val="000000"/>
+                </a:solidFill>
+                <a:latin typeface="Poppins"/>
+                <a:ea typeface="Poppins"/>
+                <a:cs typeface="Poppins"/>
+                <a:sym typeface="Poppins"/>
+              </a:rPr>
+              <a:t>Ciclos</a:t>
+            </a:r>
+            <a:r>
+              <a:rPr lang="en-US" sz="2499" dirty="0">
+                <a:solidFill>
+                  <a:srgbClr val="000000"/>
+                </a:solidFill>
+                <a:latin typeface="Poppins"/>
+                <a:ea typeface="Poppins"/>
+                <a:cs typeface="Poppins"/>
+                <a:sym typeface="Poppins"/>
+              </a:rPr>
+              <a:t> de </a:t>
+            </a:r>
+            <a:r>
+              <a:rPr lang="en-US" sz="2499" dirty="0" err="1">
+                <a:solidFill>
+                  <a:srgbClr val="000000"/>
+                </a:solidFill>
+                <a:latin typeface="Poppins"/>
+                <a:ea typeface="Poppins"/>
+                <a:cs typeface="Poppins"/>
+                <a:sym typeface="Poppins"/>
+              </a:rPr>
+              <a:t>desenvolvimento</a:t>
+            </a:r>
+            <a:r>
+              <a:rPr lang="en-US" sz="2499" dirty="0">
+                <a:solidFill>
+                  <a:srgbClr val="000000"/>
+                </a:solidFill>
+                <a:latin typeface="Poppins"/>
+                <a:ea typeface="Poppins"/>
+                <a:cs typeface="Poppins"/>
+                <a:sym typeface="Poppins"/>
+              </a:rPr>
+              <a:t> </a:t>
+            </a:r>
+            <a:r>
+              <a:rPr lang="en-US" sz="2499" dirty="0" err="1">
+                <a:solidFill>
+                  <a:srgbClr val="000000"/>
+                </a:solidFill>
+                <a:latin typeface="Poppins"/>
+                <a:ea typeface="Poppins"/>
+                <a:cs typeface="Poppins"/>
+                <a:sym typeface="Poppins"/>
+              </a:rPr>
+              <a:t>curtos</a:t>
+            </a:r>
+            <a:r>
+              <a:rPr lang="en-US" sz="2499" dirty="0">
+                <a:solidFill>
+                  <a:srgbClr val="000000"/>
+                </a:solidFill>
+                <a:latin typeface="Poppins"/>
+                <a:ea typeface="Poppins"/>
+                <a:cs typeface="Poppins"/>
+                <a:sym typeface="Poppins"/>
+              </a:rPr>
+              <a:t> e </a:t>
+            </a:r>
+            <a:r>
+              <a:rPr lang="en-US" sz="2499" dirty="0" err="1">
+                <a:solidFill>
+                  <a:srgbClr val="000000"/>
+                </a:solidFill>
+                <a:latin typeface="Poppins"/>
+                <a:ea typeface="Poppins"/>
+                <a:cs typeface="Poppins"/>
+                <a:sym typeface="Poppins"/>
+              </a:rPr>
+              <a:t>focados</a:t>
+            </a:r>
+            <a:r>
+              <a:rPr lang="en-US" sz="2499" dirty="0">
+                <a:solidFill>
+                  <a:srgbClr val="000000"/>
+                </a:solidFill>
+                <a:latin typeface="Poppins"/>
+                <a:ea typeface="Poppins"/>
+                <a:cs typeface="Poppins"/>
+                <a:sym typeface="Poppins"/>
+              </a:rPr>
+              <a:t>. </a:t>
+            </a:r>
+          </a:p>
+          <a:p>
+            <a:pPr algn="l">
+              <a:lnSpc>
+                <a:spcPts val="3449"/>
+              </a:lnSpc>
+            </a:pPr>
+            <a:r>
+              <a:rPr lang="en-US" sz="2499" dirty="0" err="1">
+                <a:solidFill>
+                  <a:srgbClr val="000000"/>
+                </a:solidFill>
+                <a:latin typeface="Poppins"/>
+                <a:ea typeface="Poppins"/>
+                <a:cs typeface="Poppins"/>
+                <a:sym typeface="Poppins"/>
+              </a:rPr>
+              <a:t>Reuniões</a:t>
+            </a:r>
+            <a:r>
+              <a:rPr lang="en-US" sz="2499" dirty="0">
+                <a:solidFill>
+                  <a:srgbClr val="000000"/>
+                </a:solidFill>
+                <a:latin typeface="Poppins"/>
+                <a:ea typeface="Poppins"/>
+                <a:cs typeface="Poppins"/>
+                <a:sym typeface="Poppins"/>
+              </a:rPr>
+              <a:t> </a:t>
+            </a:r>
+            <a:r>
+              <a:rPr lang="en-US" sz="2499" dirty="0" err="1">
+                <a:solidFill>
+                  <a:srgbClr val="000000"/>
+                </a:solidFill>
+                <a:latin typeface="Poppins"/>
+                <a:ea typeface="Poppins"/>
+                <a:cs typeface="Poppins"/>
+                <a:sym typeface="Poppins"/>
+              </a:rPr>
+              <a:t>Diárias</a:t>
+            </a:r>
+            <a:r>
+              <a:rPr lang="en-US" sz="2499" dirty="0">
+                <a:solidFill>
+                  <a:srgbClr val="000000"/>
+                </a:solidFill>
+                <a:latin typeface="Poppins"/>
+                <a:ea typeface="Poppins"/>
+                <a:cs typeface="Poppins"/>
+                <a:sym typeface="Poppins"/>
+              </a:rPr>
+              <a:t> (Daily): </a:t>
+            </a:r>
+            <a:r>
+              <a:rPr lang="en-US" sz="2499" dirty="0" err="1">
+                <a:solidFill>
+                  <a:srgbClr val="000000"/>
+                </a:solidFill>
+                <a:latin typeface="Poppins"/>
+                <a:ea typeface="Poppins"/>
+                <a:cs typeface="Poppins"/>
+                <a:sym typeface="Poppins"/>
+              </a:rPr>
+              <a:t>Alinhamento</a:t>
+            </a:r>
+            <a:r>
+              <a:rPr lang="en-US" sz="2499" dirty="0">
+                <a:solidFill>
+                  <a:srgbClr val="000000"/>
+                </a:solidFill>
+                <a:latin typeface="Poppins"/>
+                <a:ea typeface="Poppins"/>
+                <a:cs typeface="Poppins"/>
+                <a:sym typeface="Poppins"/>
+              </a:rPr>
+              <a:t> </a:t>
+            </a:r>
+            <a:r>
+              <a:rPr lang="en-US" sz="2499" dirty="0" err="1">
+                <a:solidFill>
+                  <a:srgbClr val="000000"/>
+                </a:solidFill>
+                <a:latin typeface="Poppins"/>
+                <a:ea typeface="Poppins"/>
+                <a:cs typeface="Poppins"/>
+                <a:sym typeface="Poppins"/>
+              </a:rPr>
+              <a:t>rápido</a:t>
+            </a:r>
+            <a:r>
+              <a:rPr lang="en-US" sz="2499" dirty="0">
+                <a:solidFill>
+                  <a:srgbClr val="000000"/>
+                </a:solidFill>
+                <a:latin typeface="Poppins"/>
+                <a:ea typeface="Poppins"/>
+                <a:cs typeface="Poppins"/>
+                <a:sym typeface="Poppins"/>
+              </a:rPr>
+              <a:t> </a:t>
+            </a:r>
+            <a:r>
+              <a:rPr lang="en-US" sz="2499" dirty="0" err="1">
+                <a:solidFill>
+                  <a:srgbClr val="000000"/>
+                </a:solidFill>
+                <a:latin typeface="Poppins"/>
+                <a:ea typeface="Poppins"/>
+                <a:cs typeface="Poppins"/>
+                <a:sym typeface="Poppins"/>
+              </a:rPr>
+              <a:t>sobre</a:t>
+            </a:r>
+            <a:r>
+              <a:rPr lang="en-US" sz="2499" dirty="0">
+                <a:solidFill>
+                  <a:srgbClr val="000000"/>
+                </a:solidFill>
+                <a:latin typeface="Poppins"/>
+                <a:ea typeface="Poppins"/>
+                <a:cs typeface="Poppins"/>
+                <a:sym typeface="Poppins"/>
+              </a:rPr>
+              <a:t> </a:t>
+            </a:r>
+            <a:r>
+              <a:rPr lang="en-US" sz="2499" dirty="0" err="1">
+                <a:solidFill>
+                  <a:srgbClr val="000000"/>
+                </a:solidFill>
+                <a:latin typeface="Poppins"/>
+                <a:ea typeface="Poppins"/>
+                <a:cs typeface="Poppins"/>
+                <a:sym typeface="Poppins"/>
+              </a:rPr>
+              <a:t>progresso</a:t>
+            </a:r>
+            <a:r>
+              <a:rPr lang="en-US" sz="2499" dirty="0">
+                <a:solidFill>
+                  <a:srgbClr val="000000"/>
+                </a:solidFill>
+                <a:latin typeface="Poppins"/>
+                <a:ea typeface="Poppins"/>
+                <a:cs typeface="Poppins"/>
+                <a:sym typeface="Poppins"/>
+              </a:rPr>
+              <a:t> e </a:t>
+            </a:r>
+            <a:r>
+              <a:rPr lang="en-US" sz="2499" dirty="0" err="1">
+                <a:solidFill>
+                  <a:srgbClr val="000000"/>
+                </a:solidFill>
+                <a:latin typeface="Poppins"/>
+                <a:ea typeface="Poppins"/>
+                <a:cs typeface="Poppins"/>
+                <a:sym typeface="Poppins"/>
+              </a:rPr>
+              <a:t>impedimentos</a:t>
+            </a:r>
+            <a:r>
+              <a:rPr lang="en-US" sz="2499" dirty="0">
+                <a:solidFill>
+                  <a:srgbClr val="000000"/>
+                </a:solidFill>
+                <a:latin typeface="Poppins"/>
+                <a:ea typeface="Poppins"/>
+                <a:cs typeface="Poppins"/>
+                <a:sym typeface="Poppins"/>
+              </a:rPr>
+              <a:t>. </a:t>
+            </a:r>
+          </a:p>
+          <a:p>
+            <a:pPr algn="l">
+              <a:lnSpc>
+                <a:spcPts val="3449"/>
+              </a:lnSpc>
+            </a:pPr>
+            <a:r>
+              <a:rPr lang="en-US" sz="2499" dirty="0" err="1">
+                <a:solidFill>
+                  <a:srgbClr val="000000"/>
+                </a:solidFill>
+                <a:latin typeface="Poppins"/>
+                <a:ea typeface="Poppins"/>
+                <a:cs typeface="Poppins"/>
+                <a:sym typeface="Poppins"/>
+              </a:rPr>
+              <a:t>Entrega</a:t>
+            </a:r>
+            <a:r>
+              <a:rPr lang="en-US" sz="2499" dirty="0">
+                <a:solidFill>
+                  <a:srgbClr val="000000"/>
+                </a:solidFill>
+                <a:latin typeface="Poppins"/>
+                <a:ea typeface="Poppins"/>
+                <a:cs typeface="Poppins"/>
+                <a:sym typeface="Poppins"/>
+              </a:rPr>
+              <a:t> </a:t>
+            </a:r>
+            <a:r>
+              <a:rPr lang="en-US" sz="2499" dirty="0" err="1">
+                <a:solidFill>
+                  <a:srgbClr val="000000"/>
+                </a:solidFill>
+                <a:latin typeface="Poppins"/>
+                <a:ea typeface="Poppins"/>
+                <a:cs typeface="Poppins"/>
+                <a:sym typeface="Poppins"/>
+              </a:rPr>
+              <a:t>Iterativa</a:t>
+            </a:r>
+            <a:r>
+              <a:rPr lang="en-US" sz="2499" dirty="0">
+                <a:solidFill>
+                  <a:srgbClr val="000000"/>
+                </a:solidFill>
+                <a:latin typeface="Poppins"/>
+                <a:ea typeface="Poppins"/>
+                <a:cs typeface="Poppins"/>
+                <a:sym typeface="Poppins"/>
+              </a:rPr>
+              <a:t>: </a:t>
+            </a:r>
+            <a:r>
+              <a:rPr lang="en-US" sz="2499" dirty="0" err="1">
+                <a:solidFill>
+                  <a:srgbClr val="000000"/>
+                </a:solidFill>
+                <a:latin typeface="Poppins"/>
+                <a:ea typeface="Poppins"/>
+                <a:cs typeface="Poppins"/>
+                <a:sym typeface="Poppins"/>
+              </a:rPr>
+              <a:t>Evolução</a:t>
+            </a:r>
+            <a:r>
+              <a:rPr lang="en-US" sz="2499" dirty="0">
+                <a:solidFill>
+                  <a:srgbClr val="000000"/>
+                </a:solidFill>
+                <a:latin typeface="Poppins"/>
+                <a:ea typeface="Poppins"/>
+                <a:cs typeface="Poppins"/>
+                <a:sym typeface="Poppins"/>
+              </a:rPr>
+              <a:t> </a:t>
+            </a:r>
+            <a:r>
+              <a:rPr lang="en-US" sz="2499" dirty="0" err="1">
+                <a:solidFill>
+                  <a:srgbClr val="000000"/>
+                </a:solidFill>
+                <a:latin typeface="Poppins"/>
+                <a:ea typeface="Poppins"/>
+                <a:cs typeface="Poppins"/>
+                <a:sym typeface="Poppins"/>
+              </a:rPr>
+              <a:t>constante</a:t>
+            </a:r>
+            <a:r>
+              <a:rPr lang="en-US" sz="2499" dirty="0">
+                <a:solidFill>
+                  <a:srgbClr val="000000"/>
+                </a:solidFill>
+                <a:latin typeface="Poppins"/>
+                <a:ea typeface="Poppins"/>
+                <a:cs typeface="Poppins"/>
+                <a:sym typeface="Poppins"/>
+              </a:rPr>
+              <a:t> do </a:t>
+            </a:r>
+            <a:r>
+              <a:rPr lang="en-US" sz="2499" dirty="0" err="1">
+                <a:solidFill>
+                  <a:srgbClr val="000000"/>
+                </a:solidFill>
+                <a:latin typeface="Poppins"/>
+                <a:ea typeface="Poppins"/>
+                <a:cs typeface="Poppins"/>
+                <a:sym typeface="Poppins"/>
+              </a:rPr>
+              <a:t>produto</a:t>
+            </a:r>
+            <a:r>
+              <a:rPr lang="en-US" sz="2499" dirty="0">
+                <a:solidFill>
+                  <a:srgbClr val="000000"/>
+                </a:solidFill>
+                <a:latin typeface="Poppins"/>
+                <a:ea typeface="Poppins"/>
+                <a:cs typeface="Poppins"/>
+                <a:sym typeface="Poppins"/>
+              </a:rPr>
+              <a:t> com base </a:t>
+            </a:r>
+            <a:r>
+              <a:rPr lang="en-US" sz="2499" dirty="0" err="1">
+                <a:solidFill>
+                  <a:srgbClr val="000000"/>
+                </a:solidFill>
+                <a:latin typeface="Poppins"/>
+                <a:ea typeface="Poppins"/>
+                <a:cs typeface="Poppins"/>
+                <a:sym typeface="Poppins"/>
+              </a:rPr>
+              <a:t>em</a:t>
+            </a:r>
+            <a:r>
+              <a:rPr lang="en-US" sz="2499" dirty="0">
+                <a:solidFill>
+                  <a:srgbClr val="000000"/>
+                </a:solidFill>
+                <a:latin typeface="Poppins"/>
+                <a:ea typeface="Poppins"/>
+                <a:cs typeface="Poppins"/>
+                <a:sym typeface="Poppins"/>
+              </a:rPr>
+              <a:t> feedbacks.</a:t>
             </a:r>
           </a:p>
         </p:txBody>
@@ -5573,7 +5818,7 @@
         </p:nvSpPr>
         <p:spPr>
           <a:xfrm>
-            <a:off x="0" y="0"/>
+            <a:off x="-44115" y="-114300"/>
             <a:ext cx="18288000" cy="10287000"/>
           </a:xfrm>
           <a:custGeom>
@@ -5613,9 +5858,811 @@
           </a:blipFill>
         </p:spPr>
       </p:sp>
+      <p:sp>
+        <p:nvSpPr>
+          <p:cNvPr id="5" name="TextBox 5"/>
+          <p:cNvSpPr txBox="1"/>
+          <p:nvPr/>
+        </p:nvSpPr>
+        <p:spPr>
+          <a:xfrm>
+            <a:off x="1028700" y="1847593"/>
+            <a:ext cx="6966356" cy="595674"/>
+          </a:xfrm>
+          <a:prstGeom prst="rect">
+            <a:avLst/>
+          </a:prstGeom>
+        </p:spPr>
+        <p:txBody>
+          <a:bodyPr lIns="0" tIns="0" rIns="0" bIns="0" rtlCol="0" anchor="t">
+            <a:spAutoFit/>
+          </a:bodyPr>
+          <a:lstStyle/>
+          <a:p>
+            <a:pPr algn="l">
+              <a:lnSpc>
+                <a:spcPts val="4535"/>
+              </a:lnSpc>
+            </a:pPr>
+            <a:r>
+              <a:rPr lang="en-US" sz="4115" b="1">
+                <a:solidFill>
+                  <a:srgbClr val="004AAD"/>
+                </a:solidFill>
+                <a:latin typeface="League Spartan"/>
+                <a:ea typeface="League Spartan"/>
+                <a:cs typeface="League Spartan"/>
+                <a:sym typeface="League Spartan"/>
+              </a:rPr>
+              <a:t>CLASSE E CASOS DE USO</a:t>
+            </a:r>
+          </a:p>
+        </p:txBody>
+      </p:sp>
+      <p:sp>
+        <p:nvSpPr>
+          <p:cNvPr id="7" name="TextBox 7"/>
+          <p:cNvSpPr txBox="1"/>
+          <p:nvPr/>
+        </p:nvSpPr>
+        <p:spPr>
+          <a:xfrm>
+            <a:off x="1028700" y="929021"/>
+            <a:ext cx="3768252" cy="894712"/>
+          </a:xfrm>
+          <a:prstGeom prst="rect">
+            <a:avLst/>
+          </a:prstGeom>
+        </p:spPr>
+        <p:txBody>
+          <a:bodyPr lIns="0" tIns="0" rIns="0" bIns="0" rtlCol="0" anchor="t">
+            <a:spAutoFit/>
+          </a:bodyPr>
+          <a:lstStyle/>
+          <a:p>
+            <a:pPr algn="l">
+              <a:lnSpc>
+                <a:spcPts val="7211"/>
+              </a:lnSpc>
+            </a:pPr>
+            <a:r>
+              <a:rPr lang="en-US" sz="5151" dirty="0">
+                <a:solidFill>
+                  <a:srgbClr val="000000"/>
+                </a:solidFill>
+                <a:latin typeface="Roboto"/>
+                <a:ea typeface="Roboto"/>
+                <a:cs typeface="Roboto"/>
+                <a:sym typeface="Roboto"/>
+              </a:rPr>
+              <a:t>DIAGRAMAS</a:t>
+            </a:r>
+          </a:p>
+        </p:txBody>
+      </p:sp>
       <p:grpSp>
         <p:nvGrpSpPr>
-          <p:cNvPr id="3" name="Group 3"/>
+          <p:cNvPr id="24" name="Group 23">
+            <a:extLst>
+              <a:ext uri="{FF2B5EF4-FFF2-40B4-BE49-F238E27FC236}">
+                <a16:creationId xmlns:a16="http://schemas.microsoft.com/office/drawing/2014/main" id="{D8DEC450-F626-4E42-8C88-724F8D358369}"/>
+              </a:ext>
+            </a:extLst>
+          </p:cNvPr>
+          <p:cNvGrpSpPr/>
+          <p:nvPr/>
+        </p:nvGrpSpPr>
+        <p:grpSpPr>
+          <a:xfrm>
+            <a:off x="1028700" y="2483710"/>
+            <a:ext cx="16142370" cy="7448994"/>
+            <a:chOff x="1028700" y="2483710"/>
+            <a:chExt cx="16142370" cy="7448994"/>
+          </a:xfrm>
+        </p:grpSpPr>
+        <p:sp>
+          <p:nvSpPr>
+            <p:cNvPr id="6" name="TextBox 6"/>
+            <p:cNvSpPr txBox="1"/>
+            <p:nvPr/>
+          </p:nvSpPr>
+          <p:spPr>
+            <a:xfrm>
+              <a:off x="1240784" y="2483710"/>
+              <a:ext cx="73514" cy="623173"/>
+            </a:xfrm>
+            <a:prstGeom prst="rect">
+              <a:avLst/>
+            </a:prstGeom>
+          </p:spPr>
+          <p:txBody>
+            <a:bodyPr lIns="0" tIns="0" rIns="0" bIns="0" rtlCol="0" anchor="t">
+              <a:spAutoFit/>
+            </a:bodyPr>
+            <a:lstStyle/>
+            <a:p>
+              <a:pPr algn="l">
+                <a:lnSpc>
+                  <a:spcPts val="5313"/>
+                </a:lnSpc>
+              </a:pPr>
+              <a:r>
+                <a:rPr lang="en-US" sz="2125">
+                  <a:solidFill>
+                    <a:srgbClr val="000000"/>
+                  </a:solidFill>
+                  <a:latin typeface="Poppins"/>
+                  <a:ea typeface="Poppins"/>
+                  <a:cs typeface="Poppins"/>
+                  <a:sym typeface="Poppins"/>
+                </a:rPr>
+                <a:t> </a:t>
+              </a:r>
+            </a:p>
+          </p:txBody>
+        </p:sp>
+        <p:sp>
+          <p:nvSpPr>
+            <p:cNvPr id="8" name="TextBox 8"/>
+            <p:cNvSpPr txBox="1"/>
+            <p:nvPr/>
+          </p:nvSpPr>
+          <p:spPr>
+            <a:xfrm>
+              <a:off x="1028700" y="2712310"/>
+              <a:ext cx="16142370" cy="364843"/>
+            </a:xfrm>
+            <a:prstGeom prst="rect">
+              <a:avLst/>
+            </a:prstGeom>
+          </p:spPr>
+          <p:txBody>
+            <a:bodyPr lIns="0" tIns="0" rIns="0" bIns="0" rtlCol="0" anchor="t">
+              <a:spAutoFit/>
+            </a:bodyPr>
+            <a:lstStyle/>
+            <a:p>
+              <a:pPr algn="l">
+                <a:lnSpc>
+                  <a:spcPts val="2975"/>
+                </a:lnSpc>
+              </a:pPr>
+              <a:r>
+                <a:rPr lang="en-US" sz="2125" dirty="0">
+                  <a:solidFill>
+                    <a:srgbClr val="000000"/>
+                  </a:solidFill>
+                  <a:latin typeface="Poppins"/>
+                  <a:ea typeface="Poppins"/>
+                  <a:cs typeface="Poppins"/>
+                  <a:sym typeface="Poppins"/>
+                </a:rPr>
+                <a:t>O </a:t>
+              </a:r>
+              <a:r>
+                <a:rPr lang="en-US" sz="2125" dirty="0" err="1">
+                  <a:solidFill>
+                    <a:srgbClr val="000000"/>
+                  </a:solidFill>
+                  <a:latin typeface="Poppins"/>
+                  <a:ea typeface="Poppins"/>
+                  <a:cs typeface="Poppins"/>
+                  <a:sym typeface="Poppins"/>
+                </a:rPr>
+                <a:t>diagrama</a:t>
+              </a:r>
+              <a:r>
+                <a:rPr lang="en-US" sz="2125" dirty="0">
+                  <a:solidFill>
+                    <a:srgbClr val="000000"/>
+                  </a:solidFill>
+                  <a:latin typeface="Poppins"/>
+                  <a:ea typeface="Poppins"/>
+                  <a:cs typeface="Poppins"/>
+                  <a:sym typeface="Poppins"/>
+                </a:rPr>
+                <a:t> </a:t>
+              </a:r>
+              <a:r>
+                <a:rPr lang="en-US" sz="2125" dirty="0" err="1">
+                  <a:solidFill>
+                    <a:srgbClr val="000000"/>
+                  </a:solidFill>
+                  <a:latin typeface="Poppins"/>
+                  <a:ea typeface="Poppins"/>
+                  <a:cs typeface="Poppins"/>
+                  <a:sym typeface="Poppins"/>
+                </a:rPr>
+                <a:t>abaixo</a:t>
+              </a:r>
+              <a:r>
+                <a:rPr lang="en-US" sz="2125" dirty="0">
+                  <a:solidFill>
+                    <a:srgbClr val="000000"/>
+                  </a:solidFill>
+                  <a:latin typeface="Poppins"/>
+                  <a:ea typeface="Poppins"/>
+                  <a:cs typeface="Poppins"/>
+                  <a:sym typeface="Poppins"/>
+                </a:rPr>
+                <a:t> </a:t>
+              </a:r>
+              <a:r>
+                <a:rPr lang="en-US" sz="2125" dirty="0" err="1">
+                  <a:solidFill>
+                    <a:srgbClr val="000000"/>
+                  </a:solidFill>
+                  <a:latin typeface="Poppins"/>
+                  <a:ea typeface="Poppins"/>
+                  <a:cs typeface="Poppins"/>
+                  <a:sym typeface="Poppins"/>
+                </a:rPr>
+                <a:t>ilustra</a:t>
+              </a:r>
+              <a:r>
+                <a:rPr lang="en-US" sz="2125" dirty="0">
+                  <a:solidFill>
+                    <a:srgbClr val="000000"/>
+                  </a:solidFill>
+                  <a:latin typeface="Poppins"/>
+                  <a:ea typeface="Poppins"/>
+                  <a:cs typeface="Poppins"/>
+                  <a:sym typeface="Poppins"/>
+                </a:rPr>
+                <a:t> as </a:t>
+              </a:r>
+              <a:r>
+                <a:rPr lang="en-US" sz="2125" dirty="0" err="1">
+                  <a:solidFill>
+                    <a:srgbClr val="000000"/>
+                  </a:solidFill>
+                  <a:latin typeface="Poppins"/>
+                  <a:ea typeface="Poppins"/>
+                  <a:cs typeface="Poppins"/>
+                  <a:sym typeface="Poppins"/>
+                </a:rPr>
+                <a:t>principais</a:t>
+              </a:r>
+              <a:r>
+                <a:rPr lang="en-US" sz="2125" dirty="0">
+                  <a:solidFill>
+                    <a:srgbClr val="000000"/>
+                  </a:solidFill>
+                  <a:latin typeface="Poppins"/>
+                  <a:ea typeface="Poppins"/>
+                  <a:cs typeface="Poppins"/>
+                  <a:sym typeface="Poppins"/>
+                </a:rPr>
+                <a:t> </a:t>
+              </a:r>
+              <a:r>
+                <a:rPr lang="en-US" sz="2125" dirty="0" err="1">
+                  <a:solidFill>
+                    <a:srgbClr val="000000"/>
+                  </a:solidFill>
+                  <a:latin typeface="Poppins"/>
+                  <a:ea typeface="Poppins"/>
+                  <a:cs typeface="Poppins"/>
+                  <a:sym typeface="Poppins"/>
+                </a:rPr>
+                <a:t>interações</a:t>
+              </a:r>
+              <a:r>
+                <a:rPr lang="en-US" sz="2125" dirty="0">
+                  <a:solidFill>
+                    <a:srgbClr val="000000"/>
+                  </a:solidFill>
+                  <a:latin typeface="Poppins"/>
+                  <a:ea typeface="Poppins"/>
+                  <a:cs typeface="Poppins"/>
+                  <a:sym typeface="Poppins"/>
+                </a:rPr>
+                <a:t> que </a:t>
+              </a:r>
+              <a:r>
+                <a:rPr lang="en-US" sz="2125" dirty="0" err="1">
+                  <a:solidFill>
+                    <a:srgbClr val="000000"/>
+                  </a:solidFill>
+                  <a:latin typeface="Poppins"/>
+                  <a:ea typeface="Poppins"/>
+                  <a:cs typeface="Poppins"/>
+                  <a:sym typeface="Poppins"/>
+                </a:rPr>
+                <a:t>os</a:t>
+              </a:r>
+              <a:r>
+                <a:rPr lang="en-US" sz="2125" dirty="0">
+                  <a:solidFill>
+                    <a:srgbClr val="000000"/>
+                  </a:solidFill>
+                  <a:latin typeface="Poppins"/>
+                  <a:ea typeface="Poppins"/>
+                  <a:cs typeface="Poppins"/>
+                  <a:sym typeface="Poppins"/>
+                </a:rPr>
+                <a:t> </a:t>
+              </a:r>
+              <a:r>
+                <a:rPr lang="en-US" sz="2125" dirty="0" err="1">
+                  <a:solidFill>
+                    <a:srgbClr val="000000"/>
+                  </a:solidFill>
+                  <a:latin typeface="Poppins"/>
+                  <a:ea typeface="Poppins"/>
+                  <a:cs typeface="Poppins"/>
+                  <a:sym typeface="Poppins"/>
+                </a:rPr>
+                <a:t>diferentes</a:t>
+              </a:r>
+              <a:r>
+                <a:rPr lang="en-US" sz="2125" dirty="0">
+                  <a:solidFill>
+                    <a:srgbClr val="000000"/>
+                  </a:solidFill>
+                  <a:latin typeface="Poppins"/>
+                  <a:ea typeface="Poppins"/>
+                  <a:cs typeface="Poppins"/>
+                  <a:sym typeface="Poppins"/>
+                </a:rPr>
+                <a:t> </a:t>
+              </a:r>
+              <a:r>
+                <a:rPr lang="en-US" sz="2125" dirty="0" err="1">
+                  <a:solidFill>
+                    <a:srgbClr val="000000"/>
+                  </a:solidFill>
+                  <a:latin typeface="Poppins"/>
+                  <a:ea typeface="Poppins"/>
+                  <a:cs typeface="Poppins"/>
+                  <a:sym typeface="Poppins"/>
+                </a:rPr>
+                <a:t>tipos</a:t>
+              </a:r>
+              <a:r>
+                <a:rPr lang="en-US" sz="2125" dirty="0">
+                  <a:solidFill>
+                    <a:srgbClr val="000000"/>
+                  </a:solidFill>
+                  <a:latin typeface="Poppins"/>
+                  <a:ea typeface="Poppins"/>
+                  <a:cs typeface="Poppins"/>
+                  <a:sym typeface="Poppins"/>
+                </a:rPr>
+                <a:t> de </a:t>
+              </a:r>
+              <a:r>
+                <a:rPr lang="en-US" sz="2125" dirty="0" err="1">
+                  <a:solidFill>
+                    <a:srgbClr val="000000"/>
+                  </a:solidFill>
+                  <a:latin typeface="Poppins"/>
+                  <a:ea typeface="Poppins"/>
+                  <a:cs typeface="Poppins"/>
+                  <a:sym typeface="Poppins"/>
+                </a:rPr>
+                <a:t>usuários</a:t>
+              </a:r>
+              <a:r>
+                <a:rPr lang="en-US" sz="2125" dirty="0">
+                  <a:solidFill>
+                    <a:srgbClr val="000000"/>
+                  </a:solidFill>
+                  <a:latin typeface="Poppins"/>
+                  <a:ea typeface="Poppins"/>
+                  <a:cs typeface="Poppins"/>
+                  <a:sym typeface="Poppins"/>
+                </a:rPr>
+                <a:t> </a:t>
+              </a:r>
+              <a:r>
+                <a:rPr lang="en-US" sz="2125" dirty="0" err="1">
+                  <a:solidFill>
+                    <a:srgbClr val="000000"/>
+                  </a:solidFill>
+                  <a:latin typeface="Poppins"/>
+                  <a:ea typeface="Poppins"/>
+                  <a:cs typeface="Poppins"/>
+                  <a:sym typeface="Poppins"/>
+                </a:rPr>
+                <a:t>podem</a:t>
+              </a:r>
+              <a:r>
+                <a:rPr lang="en-US" sz="2125" dirty="0">
+                  <a:solidFill>
+                    <a:srgbClr val="000000"/>
+                  </a:solidFill>
+                  <a:latin typeface="Poppins"/>
+                  <a:ea typeface="Poppins"/>
+                  <a:cs typeface="Poppins"/>
+                  <a:sym typeface="Poppins"/>
+                </a:rPr>
+                <a:t> </a:t>
+              </a:r>
+              <a:r>
+                <a:rPr lang="en-US" sz="2125" dirty="0" err="1">
+                  <a:solidFill>
+                    <a:srgbClr val="000000"/>
+                  </a:solidFill>
+                  <a:latin typeface="Poppins"/>
+                  <a:ea typeface="Poppins"/>
+                  <a:cs typeface="Poppins"/>
+                  <a:sym typeface="Poppins"/>
+                </a:rPr>
+                <a:t>ter</a:t>
+              </a:r>
+              <a:r>
+                <a:rPr lang="en-US" sz="2125" dirty="0">
+                  <a:solidFill>
+                    <a:srgbClr val="000000"/>
+                  </a:solidFill>
+                  <a:latin typeface="Poppins"/>
+                  <a:ea typeface="Poppins"/>
+                  <a:cs typeface="Poppins"/>
+                  <a:sym typeface="Poppins"/>
+                </a:rPr>
+                <a:t> com o Help System.</a:t>
+              </a:r>
+            </a:p>
+          </p:txBody>
+        </p:sp>
+        <p:pic>
+          <p:nvPicPr>
+            <p:cNvPr id="10" name="Picture 9">
+              <a:extLst>
+                <a:ext uri="{FF2B5EF4-FFF2-40B4-BE49-F238E27FC236}">
+                  <a16:creationId xmlns:a16="http://schemas.microsoft.com/office/drawing/2014/main" id="{8A49628A-FFD3-49F8-8C9C-E51248D4278B}"/>
+                </a:ext>
+              </a:extLst>
+            </p:cNvPr>
+            <p:cNvPicPr>
+              <a:picLocks noChangeAspect="1"/>
+            </p:cNvPicPr>
+            <p:nvPr/>
+          </p:nvPicPr>
+          <p:blipFill>
+            <a:blip r:embed="rId3"/>
+            <a:stretch>
+              <a:fillRect/>
+            </a:stretch>
+          </p:blipFill>
+          <p:spPr>
+            <a:xfrm>
+              <a:off x="1524000" y="3354799"/>
+              <a:ext cx="14508677" cy="6577905"/>
+            </a:xfrm>
+            <a:prstGeom prst="rect">
+              <a:avLst/>
+            </a:prstGeom>
+          </p:spPr>
+        </p:pic>
+        <p:sp>
+          <p:nvSpPr>
+            <p:cNvPr id="15" name="Arc 14">
+              <a:extLst>
+                <a:ext uri="{FF2B5EF4-FFF2-40B4-BE49-F238E27FC236}">
+                  <a16:creationId xmlns:a16="http://schemas.microsoft.com/office/drawing/2014/main" id="{E1A120F6-3FBB-47BD-9C8A-A55A65FB2D40}"/>
+                </a:ext>
+              </a:extLst>
+            </p:cNvPr>
+            <p:cNvSpPr/>
+            <p:nvPr/>
+          </p:nvSpPr>
+          <p:spPr>
+            <a:xfrm>
+              <a:off x="3810000" y="4485232"/>
+              <a:ext cx="12954000" cy="2106068"/>
+            </a:xfrm>
+            <a:prstGeom prst="arc">
+              <a:avLst>
+                <a:gd name="adj1" fmla="val 11234888"/>
+                <a:gd name="adj2" fmla="val 19879258"/>
+              </a:avLst>
+            </a:prstGeom>
+            <a:ln w="19050"/>
+          </p:spPr>
+          <p:style>
+            <a:lnRef idx="1">
+              <a:schemeClr val="dk1"/>
+            </a:lnRef>
+            <a:fillRef idx="0">
+              <a:schemeClr val="dk1"/>
+            </a:fillRef>
+            <a:effectRef idx="0">
+              <a:schemeClr val="dk1"/>
+            </a:effectRef>
+            <a:fontRef idx="minor">
+              <a:schemeClr val="tx1"/>
+            </a:fontRef>
+          </p:style>
+          <p:txBody>
+            <a:bodyPr rtlCol="0" anchor="ctr"/>
+            <a:lstStyle/>
+            <a:p>
+              <a:pPr algn="ctr"/>
+              <a:endParaRPr lang="pt-PT"/>
+            </a:p>
+          </p:txBody>
+        </p:sp>
+        <p:sp>
+          <p:nvSpPr>
+            <p:cNvPr id="11" name="TextBox 10">
+              <a:extLst>
+                <a:ext uri="{FF2B5EF4-FFF2-40B4-BE49-F238E27FC236}">
+                  <a16:creationId xmlns:a16="http://schemas.microsoft.com/office/drawing/2014/main" id="{D8478B8B-4210-433C-8A1E-68806F4E1F6E}"/>
+                </a:ext>
+              </a:extLst>
+            </p:cNvPr>
+            <p:cNvSpPr txBox="1"/>
+            <p:nvPr/>
+          </p:nvSpPr>
+          <p:spPr>
+            <a:xfrm>
+              <a:off x="7848600" y="4290860"/>
+              <a:ext cx="1060856" cy="400110"/>
+            </a:xfrm>
+            <a:prstGeom prst="rect">
+              <a:avLst/>
+            </a:prstGeom>
+            <a:solidFill>
+              <a:schemeClr val="bg1"/>
+            </a:solidFill>
+          </p:spPr>
+          <p:txBody>
+            <a:bodyPr wrap="square" rtlCol="0">
+              <a:spAutoFit/>
+            </a:bodyPr>
+            <a:lstStyle/>
+            <a:p>
+              <a:r>
+                <a:rPr lang="pt-PT" sz="2000" dirty="0"/>
+                <a:t>Escreve</a:t>
+              </a:r>
+            </a:p>
+          </p:txBody>
+        </p:sp>
+        <p:cxnSp>
+          <p:nvCxnSpPr>
+            <p:cNvPr id="17" name="Straight Connector 16">
+              <a:extLst>
+                <a:ext uri="{FF2B5EF4-FFF2-40B4-BE49-F238E27FC236}">
+                  <a16:creationId xmlns:a16="http://schemas.microsoft.com/office/drawing/2014/main" id="{957ACD87-9812-4B59-936B-8DB15F5C78CE}"/>
+                </a:ext>
+              </a:extLst>
+            </p:cNvPr>
+            <p:cNvCxnSpPr/>
+            <p:nvPr/>
+          </p:nvCxnSpPr>
+          <p:spPr>
+            <a:xfrm>
+              <a:off x="5257800" y="7505700"/>
+              <a:ext cx="1213256" cy="552510"/>
+            </a:xfrm>
+            <a:prstGeom prst="line">
+              <a:avLst/>
+            </a:prstGeom>
+            <a:ln w="19050"/>
+          </p:spPr>
+          <p:style>
+            <a:lnRef idx="1">
+              <a:schemeClr val="dk1"/>
+            </a:lnRef>
+            <a:fillRef idx="0">
+              <a:schemeClr val="dk1"/>
+            </a:fillRef>
+            <a:effectRef idx="0">
+              <a:schemeClr val="dk1"/>
+            </a:effectRef>
+            <a:fontRef idx="minor">
+              <a:schemeClr val="tx1"/>
+            </a:fontRef>
+          </p:style>
+        </p:cxnSp>
+        <p:sp>
+          <p:nvSpPr>
+            <p:cNvPr id="12" name="TextBox 11">
+              <a:extLst>
+                <a:ext uri="{FF2B5EF4-FFF2-40B4-BE49-F238E27FC236}">
+                  <a16:creationId xmlns:a16="http://schemas.microsoft.com/office/drawing/2014/main" id="{2B88FA50-8154-4AAD-9DC2-F23A611CCA3D}"/>
+                </a:ext>
+              </a:extLst>
+            </p:cNvPr>
+            <p:cNvSpPr txBox="1"/>
+            <p:nvPr/>
+          </p:nvSpPr>
+          <p:spPr>
+            <a:xfrm>
+              <a:off x="5410200" y="7658100"/>
+              <a:ext cx="762000" cy="400110"/>
+            </a:xfrm>
+            <a:prstGeom prst="rect">
+              <a:avLst/>
+            </a:prstGeom>
+            <a:solidFill>
+              <a:schemeClr val="bg1"/>
+            </a:solidFill>
+          </p:spPr>
+          <p:txBody>
+            <a:bodyPr wrap="square" rtlCol="0">
+              <a:spAutoFit/>
+            </a:bodyPr>
+            <a:lstStyle/>
+            <a:p>
+              <a:r>
+                <a:rPr lang="pt-PT" sz="2000" dirty="0"/>
+                <a:t>Cria</a:t>
+              </a:r>
+            </a:p>
+          </p:txBody>
+        </p:sp>
+        <p:cxnSp>
+          <p:nvCxnSpPr>
+            <p:cNvPr id="19" name="Straight Connector 18">
+              <a:extLst>
+                <a:ext uri="{FF2B5EF4-FFF2-40B4-BE49-F238E27FC236}">
+                  <a16:creationId xmlns:a16="http://schemas.microsoft.com/office/drawing/2014/main" id="{5E0E4C03-4D89-47EF-BCD5-6FBE6028F563}"/>
+                </a:ext>
+              </a:extLst>
+            </p:cNvPr>
+            <p:cNvCxnSpPr>
+              <a:cxnSpLocks/>
+            </p:cNvCxnSpPr>
+            <p:nvPr/>
+          </p:nvCxnSpPr>
+          <p:spPr>
+            <a:xfrm flipV="1">
+              <a:off x="10134600" y="5695869"/>
+              <a:ext cx="2057400" cy="947882"/>
+            </a:xfrm>
+            <a:prstGeom prst="line">
+              <a:avLst/>
+            </a:prstGeom>
+            <a:ln w="19050"/>
+          </p:spPr>
+          <p:style>
+            <a:lnRef idx="1">
+              <a:schemeClr val="dk1"/>
+            </a:lnRef>
+            <a:fillRef idx="0">
+              <a:schemeClr val="dk1"/>
+            </a:fillRef>
+            <a:effectRef idx="0">
+              <a:schemeClr val="dk1"/>
+            </a:effectRef>
+            <a:fontRef idx="minor">
+              <a:schemeClr val="tx1"/>
+            </a:fontRef>
+          </p:style>
+        </p:cxnSp>
+        <p:sp>
+          <p:nvSpPr>
+            <p:cNvPr id="14" name="TextBox 13">
+              <a:extLst>
+                <a:ext uri="{FF2B5EF4-FFF2-40B4-BE49-F238E27FC236}">
+                  <a16:creationId xmlns:a16="http://schemas.microsoft.com/office/drawing/2014/main" id="{7CC3775D-1DDB-4A94-8F0B-5518407F32A4}"/>
+                </a:ext>
+              </a:extLst>
+            </p:cNvPr>
+            <p:cNvSpPr txBox="1"/>
+            <p:nvPr/>
+          </p:nvSpPr>
+          <p:spPr>
+            <a:xfrm>
+              <a:off x="10726354" y="5935865"/>
+              <a:ext cx="1060856" cy="707886"/>
+            </a:xfrm>
+            <a:prstGeom prst="rect">
+              <a:avLst/>
+            </a:prstGeom>
+            <a:solidFill>
+              <a:schemeClr val="bg1"/>
+            </a:solidFill>
+          </p:spPr>
+          <p:txBody>
+            <a:bodyPr wrap="square" rtlCol="0">
+              <a:spAutoFit/>
+            </a:bodyPr>
+            <a:lstStyle/>
+            <a:p>
+              <a:r>
+                <a:rPr lang="pt-PT" sz="2000" dirty="0"/>
+                <a:t>Tem</a:t>
+              </a:r>
+            </a:p>
+            <a:p>
+              <a:endParaRPr lang="pt-PT" sz="2000" dirty="0"/>
+            </a:p>
+          </p:txBody>
+        </p:sp>
+        <p:cxnSp>
+          <p:nvCxnSpPr>
+            <p:cNvPr id="22" name="Straight Connector 21">
+              <a:extLst>
+                <a:ext uri="{FF2B5EF4-FFF2-40B4-BE49-F238E27FC236}">
+                  <a16:creationId xmlns:a16="http://schemas.microsoft.com/office/drawing/2014/main" id="{346B3D58-02ED-44A7-89D7-60CD7AD3B303}"/>
+                </a:ext>
+              </a:extLst>
+            </p:cNvPr>
+            <p:cNvCxnSpPr>
+              <a:cxnSpLocks/>
+            </p:cNvCxnSpPr>
+            <p:nvPr/>
+          </p:nvCxnSpPr>
+          <p:spPr>
+            <a:xfrm>
+              <a:off x="10134600" y="8191500"/>
+              <a:ext cx="2667000" cy="0"/>
+            </a:xfrm>
+            <a:prstGeom prst="line">
+              <a:avLst/>
+            </a:prstGeom>
+            <a:ln w="19050"/>
+          </p:spPr>
+          <p:style>
+            <a:lnRef idx="1">
+              <a:schemeClr val="dk1"/>
+            </a:lnRef>
+            <a:fillRef idx="0">
+              <a:schemeClr val="dk1"/>
+            </a:fillRef>
+            <a:effectRef idx="0">
+              <a:schemeClr val="dk1"/>
+            </a:effectRef>
+            <a:fontRef idx="minor">
+              <a:schemeClr val="tx1"/>
+            </a:fontRef>
+          </p:style>
+        </p:cxnSp>
+        <p:sp>
+          <p:nvSpPr>
+            <p:cNvPr id="13" name="TextBox 12">
+              <a:extLst>
+                <a:ext uri="{FF2B5EF4-FFF2-40B4-BE49-F238E27FC236}">
+                  <a16:creationId xmlns:a16="http://schemas.microsoft.com/office/drawing/2014/main" id="{B510BFB4-5401-4E8E-9BDA-84828C1ACDA1}"/>
+                </a:ext>
+              </a:extLst>
+            </p:cNvPr>
+            <p:cNvSpPr txBox="1"/>
+            <p:nvPr/>
+          </p:nvSpPr>
+          <p:spPr>
+            <a:xfrm>
+              <a:off x="10494782" y="7996481"/>
+              <a:ext cx="1524000" cy="707886"/>
+            </a:xfrm>
+            <a:prstGeom prst="rect">
+              <a:avLst/>
+            </a:prstGeom>
+            <a:solidFill>
+              <a:schemeClr val="bg1"/>
+            </a:solidFill>
+          </p:spPr>
+          <p:txBody>
+            <a:bodyPr wrap="square" rtlCol="0">
+              <a:spAutoFit/>
+            </a:bodyPr>
+            <a:lstStyle/>
+            <a:p>
+              <a:r>
+                <a:rPr lang="pt-PT" sz="2000" dirty="0"/>
+                <a:t>Pertence a</a:t>
+              </a:r>
+            </a:p>
+            <a:p>
+              <a:endParaRPr lang="pt-PT" sz="2000" dirty="0"/>
+            </a:p>
+          </p:txBody>
+        </p:sp>
+      </p:grpSp>
+      <p:grpSp>
+        <p:nvGrpSpPr>
+          <p:cNvPr id="25" name="Group 7">
+            <a:extLst>
+              <a:ext uri="{FF2B5EF4-FFF2-40B4-BE49-F238E27FC236}">
+                <a16:creationId xmlns:a16="http://schemas.microsoft.com/office/drawing/2014/main" id="{E5A2827B-5A7E-4860-BCCF-ECBC03B501C1}"/>
+              </a:ext>
+            </a:extLst>
+          </p:cNvPr>
           <p:cNvGrpSpPr>
             <a:grpSpLocks noChangeAspect="1"/>
           </p:cNvGrpSpPr>
@@ -5623,15 +6670,21 @@
         </p:nvGrpSpPr>
         <p:grpSpPr>
           <a:xfrm>
-            <a:off x="1028700" y="8997953"/>
-            <a:ext cx="2515019" cy="260347"/>
+            <a:off x="1028700" y="9227805"/>
+            <a:ext cx="2514943" cy="260347"/>
             <a:chOff x="0" y="0"/>
-            <a:chExt cx="2515019" cy="260350"/>
+            <a:chExt cx="2514943" cy="260350"/>
           </a:xfrm>
         </p:grpSpPr>
         <p:sp>
           <p:nvSpPr>
-            <p:cNvPr id="4" name="Freeform 4"/>
+            <p:cNvPr id="26" name="Freeform 8">
+              <a:extLst>
+                <a:ext uri="{FF2B5EF4-FFF2-40B4-BE49-F238E27FC236}">
+                  <a16:creationId xmlns:a16="http://schemas.microsoft.com/office/drawing/2014/main" id="{56E04013-A54C-4B88-A0A0-CC510E681C24}"/>
+                </a:ext>
+              </a:extLst>
+            </p:cNvPr>
             <p:cNvSpPr/>
             <p:nvPr/>
           </p:nvSpPr>
@@ -5670,170 +6723,6 @@
           </p:spPr>
         </p:sp>
       </p:grpSp>
-      <p:sp>
-        <p:nvSpPr>
-          <p:cNvPr id="5" name="TextBox 5"/>
-          <p:cNvSpPr txBox="1"/>
-          <p:nvPr/>
-        </p:nvSpPr>
-        <p:spPr>
-          <a:xfrm>
-            <a:off x="1028700" y="1847593"/>
-            <a:ext cx="6966356" cy="595674"/>
-          </a:xfrm>
-          <a:prstGeom prst="rect">
-            <a:avLst/>
-          </a:prstGeom>
-        </p:spPr>
-        <p:txBody>
-          <a:bodyPr lIns="0" tIns="0" rIns="0" bIns="0" rtlCol="0" anchor="t">
-            <a:spAutoFit/>
-          </a:bodyPr>
-          <a:lstStyle/>
-          <a:p>
-            <a:pPr algn="l">
-              <a:lnSpc>
-                <a:spcPts val="4535"/>
-              </a:lnSpc>
-            </a:pPr>
-            <a:r>
-              <a:rPr lang="en-US" sz="4115" b="1">
-                <a:solidFill>
-                  <a:srgbClr val="004AAD"/>
-                </a:solidFill>
-                <a:latin typeface="League Spartan"/>
-                <a:ea typeface="League Spartan"/>
-                <a:cs typeface="League Spartan"/>
-                <a:sym typeface="League Spartan"/>
-              </a:rPr>
-              <a:t>CLASSE E CASOS DE USO</a:t>
-            </a:r>
-          </a:p>
-        </p:txBody>
-      </p:sp>
-      <p:sp>
-        <p:nvSpPr>
-          <p:cNvPr id="6" name="TextBox 6"/>
-          <p:cNvSpPr txBox="1"/>
-          <p:nvPr/>
-        </p:nvSpPr>
-        <p:spPr>
-          <a:xfrm>
-            <a:off x="1240784" y="2483710"/>
-            <a:ext cx="73514" cy="623173"/>
-          </a:xfrm>
-          <a:prstGeom prst="rect">
-            <a:avLst/>
-          </a:prstGeom>
-        </p:spPr>
-        <p:txBody>
-          <a:bodyPr lIns="0" tIns="0" rIns="0" bIns="0" rtlCol="0" anchor="t">
-            <a:spAutoFit/>
-          </a:bodyPr>
-          <a:lstStyle/>
-          <a:p>
-            <a:pPr algn="l">
-              <a:lnSpc>
-                <a:spcPts val="5313"/>
-              </a:lnSpc>
-            </a:pPr>
-            <a:r>
-              <a:rPr lang="en-US" sz="2125">
-                <a:solidFill>
-                  <a:srgbClr val="000000"/>
-                </a:solidFill>
-                <a:latin typeface="Poppins"/>
-                <a:ea typeface="Poppins"/>
-                <a:cs typeface="Poppins"/>
-                <a:sym typeface="Poppins"/>
-              </a:rPr>
-              <a:t> </a:t>
-            </a:r>
-          </a:p>
-        </p:txBody>
-      </p:sp>
-      <p:sp>
-        <p:nvSpPr>
-          <p:cNvPr id="7" name="TextBox 7"/>
-          <p:cNvSpPr txBox="1"/>
-          <p:nvPr/>
-        </p:nvSpPr>
-        <p:spPr>
-          <a:xfrm>
-            <a:off x="1028700" y="929021"/>
-            <a:ext cx="3768252" cy="894712"/>
-          </a:xfrm>
-          <a:prstGeom prst="rect">
-            <a:avLst/>
-          </a:prstGeom>
-        </p:spPr>
-        <p:txBody>
-          <a:bodyPr lIns="0" tIns="0" rIns="0" bIns="0" rtlCol="0" anchor="t">
-            <a:spAutoFit/>
-          </a:bodyPr>
-          <a:lstStyle/>
-          <a:p>
-            <a:pPr algn="l">
-              <a:lnSpc>
-                <a:spcPts val="7211"/>
-              </a:lnSpc>
-            </a:pPr>
-            <a:r>
-              <a:rPr lang="en-US" sz="5151">
-                <a:solidFill>
-                  <a:srgbClr val="000000"/>
-                </a:solidFill>
-                <a:latin typeface="Roboto"/>
-                <a:ea typeface="Roboto"/>
-                <a:cs typeface="Roboto"/>
-                <a:sym typeface="Roboto"/>
-              </a:rPr>
-              <a:t>DIAGRAMAS</a:t>
-            </a:r>
-          </a:p>
-        </p:txBody>
-      </p:sp>
-      <p:sp>
-        <p:nvSpPr>
-          <p:cNvPr id="8" name="TextBox 8"/>
-          <p:cNvSpPr txBox="1"/>
-          <p:nvPr/>
-        </p:nvSpPr>
-        <p:spPr>
-          <a:xfrm>
-            <a:off x="1028700" y="2712310"/>
-            <a:ext cx="16142370" cy="394573"/>
-          </a:xfrm>
-          <a:prstGeom prst="rect">
-            <a:avLst/>
-          </a:prstGeom>
-        </p:spPr>
-        <p:txBody>
-          <a:bodyPr lIns="0" tIns="0" rIns="0" bIns="0" rtlCol="0" anchor="t">
-            <a:spAutoFit/>
-          </a:bodyPr>
-          <a:lstStyle/>
-          <a:p>
-            <a:pPr algn="l">
-              <a:lnSpc>
-                <a:spcPts val="2975"/>
-              </a:lnSpc>
-            </a:pPr>
-            <a:r>
-              <a:rPr lang="en-US" sz="2125">
-                <a:solidFill>
-                  <a:srgbClr val="000000"/>
-                </a:solidFill>
-                <a:latin typeface="Poppins"/>
-                <a:ea typeface="Poppins"/>
-                <a:cs typeface="Poppins"/>
-                <a:sym typeface="Poppins"/>
-              </a:rPr>
-              <a:t>Odiagramaabaixoilustraasprincipaisinteraçõesque os diferentes tipos de usuários podem ter com o Help System.</a:t>
-            </a:r>
-          </a:p>
-        </p:txBody>
-      </p:sp>
     </p:spTree>
   </p:cSld>
   <p:clrMapOvr>

</xml_diff>

<commit_message>
versão final do css
</commit_message>
<xml_diff>
--- a/utils/Modelo de Apresentação.pptx
+++ b/utils/Modelo de Apresentação.pptx
@@ -12070,138 +12070,6 @@
           </p:spPr>
         </p:sp>
       </p:grpSp>
-      <p:grpSp>
-        <p:nvGrpSpPr>
-          <p:cNvPr id="5" name="Group 5"/>
-          <p:cNvGrpSpPr>
-            <a:grpSpLocks noChangeAspect="1"/>
-          </p:cNvGrpSpPr>
-          <p:nvPr/>
-        </p:nvGrpSpPr>
-        <p:grpSpPr>
-          <a:xfrm>
-            <a:off x="1085240" y="10897743"/>
-            <a:ext cx="6412049" cy="8647500"/>
-            <a:chOff x="0" y="0"/>
-            <a:chExt cx="8549399" cy="11530000"/>
-          </a:xfrm>
-        </p:grpSpPr>
-        <p:sp>
-          <p:nvSpPr>
-            <p:cNvPr id="6" name="Freeform 6"/>
-            <p:cNvSpPr/>
-            <p:nvPr/>
-          </p:nvSpPr>
-          <p:spPr>
-            <a:xfrm>
-              <a:off x="0" y="0"/>
-              <a:ext cx="8549386" cy="11530076"/>
-            </a:xfrm>
-            <a:custGeom>
-              <a:avLst/>
-              <a:gdLst/>
-              <a:ahLst/>
-              <a:cxnLst/>
-              <a:rect l="l" t="t" r="r" b="b"/>
-              <a:pathLst>
-                <a:path w="8549386" h="11530076">
-                  <a:moveTo>
-                    <a:pt x="853440" y="0"/>
-                  </a:moveTo>
-                  <a:cubicBezTo>
-                    <a:pt x="383032" y="0"/>
-                    <a:pt x="0" y="379984"/>
-                    <a:pt x="0" y="853440"/>
-                  </a:cubicBezTo>
-                  <a:lnTo>
-                    <a:pt x="0" y="10684510"/>
-                  </a:lnTo>
-                  <a:cubicBezTo>
-                    <a:pt x="0" y="11115421"/>
-                    <a:pt x="318897" y="11473053"/>
-                    <a:pt x="736346" y="11530076"/>
-                  </a:cubicBezTo>
-                  <a:lnTo>
-                    <a:pt x="7812786" y="11530076"/>
-                  </a:lnTo>
-                  <a:cubicBezTo>
-                    <a:pt x="8228203" y="11473307"/>
-                    <a:pt x="8549386" y="11118088"/>
-                    <a:pt x="8549386" y="10684510"/>
-                  </a:cubicBezTo>
-                  <a:lnTo>
-                    <a:pt x="8546338" y="853440"/>
-                  </a:lnTo>
-                  <a:cubicBezTo>
-                    <a:pt x="8546338" y="383032"/>
-                    <a:pt x="8166354" y="0"/>
-                    <a:pt x="7692898" y="0"/>
-                  </a:cubicBezTo>
-                  <a:close/>
-                </a:path>
-              </a:pathLst>
-            </a:custGeom>
-            <a:blipFill>
-              <a:blip r:embed="rId3"/>
-              <a:stretch>
-                <a:fillRect l="-28099" r="-28243"/>
-              </a:stretch>
-            </a:blipFill>
-          </p:spPr>
-        </p:sp>
-      </p:grpSp>
-      <p:sp>
-        <p:nvSpPr>
-          <p:cNvPr id="7" name="Freeform 7"/>
-          <p:cNvSpPr/>
-          <p:nvPr/>
-        </p:nvSpPr>
-        <p:spPr>
-          <a:xfrm>
-            <a:off x="1096389" y="10784910"/>
-            <a:ext cx="6525139" cy="8760390"/>
-          </a:xfrm>
-          <a:custGeom>
-            <a:avLst/>
-            <a:gdLst/>
-            <a:ahLst/>
-            <a:cxnLst/>
-            <a:rect l="l" t="t" r="r" b="b"/>
-            <a:pathLst>
-              <a:path w="6525139" h="8760390">
-                <a:moveTo>
-                  <a:pt x="0" y="0"/>
-                </a:moveTo>
-                <a:lnTo>
-                  <a:pt x="6525139" y="0"/>
-                </a:lnTo>
-                <a:lnTo>
-                  <a:pt x="6525139" y="8760390"/>
-                </a:lnTo>
-                <a:lnTo>
-                  <a:pt x="0" y="8760390"/>
-                </a:lnTo>
-                <a:lnTo>
-                  <a:pt x="0" y="0"/>
-                </a:lnTo>
-                <a:close/>
-              </a:path>
-            </a:pathLst>
-          </a:custGeom>
-          <a:blipFill>
-            <a:blip r:embed="rId4">
-              <a:extLst>
-                <a:ext uri="{96DAC541-7B7A-43D3-8B79-37D633B846F1}">
-                  <asvg:svgBlip xmlns:asvg="http://schemas.microsoft.com/office/drawing/2016/SVG/main" r:embed="rId5"/>
-                </a:ext>
-              </a:extLst>
-            </a:blip>
-            <a:stretch>
-              <a:fillRect/>
-            </a:stretch>
-          </a:blipFill>
-        </p:spPr>
-      </p:sp>
       <p:sp>
         <p:nvSpPr>
           <p:cNvPr id="8" name="TextBox 8"/>
@@ -12374,8 +12242,8 @@
         </p:nvSpPr>
         <p:spPr>
           <a:xfrm>
-            <a:off x="10360514" y="3453281"/>
-            <a:ext cx="7622687" cy="1969770"/>
+            <a:off x="10512914" y="3453281"/>
+            <a:ext cx="7470287" cy="2462213"/>
           </a:xfrm>
           <a:prstGeom prst="rect">
             <a:avLst/>
@@ -12392,7 +12260,7 @@
               <a:rPr lang="pt-PT" sz="3200" b="0" i="0" u="none" strike="noStrike" baseline="0" dirty="0">
                 <a:latin typeface="FiraSans-Regular"/>
               </a:rPr>
-              <a:t>Protótipos de baixa e média fidelidade das interfaces do sistema Helpline para validar o fluxo de usuário, a usabilidade e o design antes da implementação técnica final.</a:t>
+              <a:t>Protótipos feitos no Canva de baixa e média fidelidade das interfaces do sistema Helpline para validar o fluxo de usuário, a usabilidade e o design antes da implementação técnica final.</a:t>
             </a:r>
             <a:endParaRPr lang="en-US" sz="3200" dirty="0">
               <a:latin typeface="Poppins"/>
@@ -12543,8 +12411,38 @@
       </p:sp>
       <p:pic>
         <p:nvPicPr>
+          <p:cNvPr id="14" name="Picture 13">
+            <a:hlinkClick r:id="rId3"/>
+            <a:extLst>
+              <a:ext uri="{FF2B5EF4-FFF2-40B4-BE49-F238E27FC236}">
+                <a16:creationId xmlns:a16="http://schemas.microsoft.com/office/drawing/2014/main" id="{66C65965-9862-4AB1-896B-48E758A91A03}"/>
+              </a:ext>
+            </a:extLst>
+          </p:cNvPr>
+          <p:cNvPicPr>
+            <a:picLocks noChangeAspect="1"/>
+          </p:cNvPicPr>
+          <p:nvPr/>
+        </p:nvPicPr>
+        <p:blipFill rotWithShape="1">
+          <a:blip r:embed="rId4"/>
+          <a:srcRect l="25000" t="27778" r="19583" b="10513"/>
+          <a:stretch/>
+        </p:blipFill>
+        <p:spPr>
+          <a:xfrm>
+            <a:off x="287772" y="2651208"/>
+            <a:ext cx="9920344" cy="6213870"/>
+          </a:xfrm>
+          <a:prstGeom prst="rect">
+            <a:avLst/>
+          </a:prstGeom>
+        </p:spPr>
+      </p:pic>
+      <p:pic>
+        <p:nvPicPr>
           <p:cNvPr id="2052" name="Picture 4">
-            <a:hlinkClick r:id="rId6"/>
+            <a:hlinkClick r:id="rId3"/>
             <a:extLst>
               <a:ext uri="{FF2B5EF4-FFF2-40B4-BE49-F238E27FC236}">
                 <a16:creationId xmlns:a16="http://schemas.microsoft.com/office/drawing/2014/main" id="{E47D4183-0601-4594-87D6-EFF91F602471}"/>
@@ -12560,7 +12458,7 @@
           <p:nvPr/>
         </p:nvPicPr>
         <p:blipFill>
-          <a:blip r:embed="rId7">
+          <a:blip r:embed="rId5">
             <a:extLst>
               <a:ext uri="{28A0092B-C50C-407E-A947-70E740481C1C}">
                 <a14:useLocalDpi xmlns:a14="http://schemas.microsoft.com/office/drawing/2010/main" val="0"/>
@@ -12574,8 +12472,8 @@
         </p:blipFill>
         <p:spPr bwMode="auto">
           <a:xfrm>
-            <a:off x="3785977" y="2728248"/>
-            <a:ext cx="3368920" cy="3368920"/>
+            <a:off x="533400" y="3619500"/>
+            <a:ext cx="2133600" cy="2133600"/>
           </a:xfrm>
           <a:prstGeom prst="rect">
             <a:avLst/>

</xml_diff>

<commit_message>
Update Modelo de Apresentação.pptx
</commit_message>
<xml_diff>
--- a/utils/Modelo de Apresentação.pptx
+++ b/utils/Modelo de Apresentação.pptx
@@ -4582,7 +4582,7 @@
         <p:spPr>
           <a:xfrm>
             <a:off x="12637560" y="5276783"/>
-            <a:ext cx="3170311" cy="4256332"/>
+            <a:ext cx="3593040" cy="4256332"/>
           </a:xfrm>
           <a:custGeom>
             <a:avLst/>
@@ -11801,53 +11801,6 @@
         </p:sp>
         <p:pic>
           <p:nvPicPr>
-            <p:cNvPr id="1030" name="Picture 6" descr="Flask Logo Icon SVG Vector &amp; PNG Free Download | UXWing">
-              <a:extLst>
-                <a:ext uri="{FF2B5EF4-FFF2-40B4-BE49-F238E27FC236}">
-                  <a16:creationId xmlns:a16="http://schemas.microsoft.com/office/drawing/2014/main" id="{0F817F64-995E-45A2-89CB-7825B251B850}"/>
-                </a:ext>
-              </a:extLst>
-            </p:cNvPr>
-            <p:cNvPicPr>
-              <a:picLocks noChangeAspect="1" noChangeArrowheads="1"/>
-            </p:cNvPicPr>
-            <p:nvPr/>
-          </p:nvPicPr>
-          <p:blipFill>
-            <a:blip r:embed="rId3">
-              <a:extLst>
-                <a:ext uri="{28A0092B-C50C-407E-A947-70E740481C1C}">
-                  <a14:useLocalDpi xmlns:a14="http://schemas.microsoft.com/office/drawing/2010/main" val="0"/>
-                </a:ext>
-              </a:extLst>
-            </a:blip>
-            <a:srcRect/>
-            <a:stretch>
-              <a:fillRect/>
-            </a:stretch>
-          </p:blipFill>
-          <p:spPr bwMode="auto">
-            <a:xfrm>
-              <a:off x="10980901" y="5105400"/>
-              <a:ext cx="4876800" cy="4876800"/>
-            </a:xfrm>
-            <a:prstGeom prst="rect">
-              <a:avLst/>
-            </a:prstGeom>
-            <a:noFill/>
-            <a:extLst>
-              <a:ext uri="{909E8E84-426E-40DD-AFC4-6F175D3DCCD1}">
-                <a14:hiddenFill xmlns:a14="http://schemas.microsoft.com/office/drawing/2010/main">
-                  <a:solidFill>
-                    <a:srgbClr val="FFFFFF"/>
-                  </a:solidFill>
-                </a14:hiddenFill>
-              </a:ext>
-            </a:extLst>
-          </p:spPr>
-        </p:pic>
-        <p:pic>
-          <p:nvPicPr>
             <p:cNvPr id="1036" name="Picture 12" descr="CSS Icon SVG Vector &amp; PNG Free Download | UXWing">
               <a:extLst>
                 <a:ext uri="{FF2B5EF4-FFF2-40B4-BE49-F238E27FC236}">
@@ -11861,7 +11814,7 @@
             <p:nvPr/>
           </p:nvPicPr>
           <p:blipFill>
-            <a:blip r:embed="rId4">
+            <a:blip r:embed="rId3">
               <a:extLst>
                 <a:ext uri="{28A0092B-C50C-407E-A947-70E740481C1C}">
                   <a14:useLocalDpi xmlns:a14="http://schemas.microsoft.com/office/drawing/2010/main" val="0"/>
@@ -11908,7 +11861,7 @@
             <p:nvPr/>
           </p:nvPicPr>
           <p:blipFill>
-            <a:blip r:embed="rId5">
+            <a:blip r:embed="rId4">
               <a:extLst>
                 <a:ext uri="{28A0092B-C50C-407E-A947-70E740481C1C}">
                   <a14:useLocalDpi xmlns:a14="http://schemas.microsoft.com/office/drawing/2010/main" val="0"/>
@@ -11940,6 +11893,45 @@
           </p:spPr>
         </p:pic>
       </p:grpSp>
+      <p:pic>
+        <p:nvPicPr>
+          <p:cNvPr id="22" name="Graphic 21">
+            <a:extLst>
+              <a:ext uri="{FF2B5EF4-FFF2-40B4-BE49-F238E27FC236}">
+                <a16:creationId xmlns:a16="http://schemas.microsoft.com/office/drawing/2014/main" id="{A6EF1841-B256-4B31-99D7-9855BEDF3095}"/>
+              </a:ext>
+            </a:extLst>
+          </p:cNvPr>
+          <p:cNvPicPr>
+            <a:picLocks noChangeAspect="1"/>
+          </p:cNvPicPr>
+          <p:nvPr/>
+        </p:nvPicPr>
+        <p:blipFill>
+          <a:blip r:embed="rId5">
+            <a:extLst>
+              <a:ext uri="{28A0092B-C50C-407E-A947-70E740481C1C}">
+                <a14:useLocalDpi xmlns:a14="http://schemas.microsoft.com/office/drawing/2010/main" val="0"/>
+              </a:ext>
+              <a:ext uri="{96DAC541-7B7A-43D3-8B79-37D633B846F1}">
+                <asvg:svgBlip xmlns:asvg="http://schemas.microsoft.com/office/drawing/2016/SVG/main" r:embed="rId6"/>
+              </a:ext>
+            </a:extLst>
+          </a:blip>
+          <a:stretch>
+            <a:fillRect/>
+          </a:stretch>
+        </p:blipFill>
+        <p:spPr>
+          <a:xfrm>
+            <a:off x="11779061" y="6541655"/>
+            <a:ext cx="4870073" cy="2069436"/>
+          </a:xfrm>
+          <a:prstGeom prst="rect">
+            <a:avLst/>
+          </a:prstGeom>
+        </p:spPr>
+      </p:pic>
     </p:spTree>
   </p:cSld>
   <p:clrMapOvr>

</xml_diff>